<commit_message>
New fonts, temporary endings, documentation updated
Several new fonts, temporary ending commands, and documentation updated!
</commit_message>
<xml_diff>
--- a/figures/figs.pptx
+++ b/figures/figs.pptx
@@ -7,8 +7,9 @@
   <p:sldIdLst>
     <p:sldId id="256" r:id="rId2"/>
     <p:sldId id="262" r:id="rId3"/>
-    <p:sldId id="260" r:id="rId4"/>
-    <p:sldId id="261" r:id="rId5"/>
+    <p:sldId id="263" r:id="rId4"/>
+    <p:sldId id="260" r:id="rId5"/>
+    <p:sldId id="261" r:id="rId6"/>
   </p:sldIdLst>
   <p:sldSz cx="12192000" cy="6858000"/>
   <p:notesSz cx="6858000" cy="9144000"/>
@@ -262,7 +263,7 @@
           <a:p>
             <a:fld id="{E1D21841-37EE-4C4F-8C0E-B2B5846679B2}" type="datetimeFigureOut">
               <a:rPr lang="en-US" smtClean="0"/>
-              <a:t>8/27/23</a:t>
+              <a:t>9/10/23</a:t>
             </a:fld>
             <a:endParaRPr lang="en-US"/>
           </a:p>
@@ -460,7 +461,7 @@
           <a:p>
             <a:fld id="{E1D21841-37EE-4C4F-8C0E-B2B5846679B2}" type="datetimeFigureOut">
               <a:rPr lang="en-US" smtClean="0"/>
-              <a:t>8/27/23</a:t>
+              <a:t>9/10/23</a:t>
             </a:fld>
             <a:endParaRPr lang="en-US"/>
           </a:p>
@@ -668,7 +669,7 @@
           <a:p>
             <a:fld id="{E1D21841-37EE-4C4F-8C0E-B2B5846679B2}" type="datetimeFigureOut">
               <a:rPr lang="en-US" smtClean="0"/>
-              <a:t>8/27/23</a:t>
+              <a:t>9/10/23</a:t>
             </a:fld>
             <a:endParaRPr lang="en-US"/>
           </a:p>
@@ -866,7 +867,7 @@
           <a:p>
             <a:fld id="{E1D21841-37EE-4C4F-8C0E-B2B5846679B2}" type="datetimeFigureOut">
               <a:rPr lang="en-US" smtClean="0"/>
-              <a:t>8/27/23</a:t>
+              <a:t>9/10/23</a:t>
             </a:fld>
             <a:endParaRPr lang="en-US"/>
           </a:p>
@@ -1141,7 +1142,7 @@
           <a:p>
             <a:fld id="{E1D21841-37EE-4C4F-8C0E-B2B5846679B2}" type="datetimeFigureOut">
               <a:rPr lang="en-US" smtClean="0"/>
-              <a:t>8/27/23</a:t>
+              <a:t>9/10/23</a:t>
             </a:fld>
             <a:endParaRPr lang="en-US"/>
           </a:p>
@@ -1406,7 +1407,7 @@
           <a:p>
             <a:fld id="{E1D21841-37EE-4C4F-8C0E-B2B5846679B2}" type="datetimeFigureOut">
               <a:rPr lang="en-US" smtClean="0"/>
-              <a:t>8/27/23</a:t>
+              <a:t>9/10/23</a:t>
             </a:fld>
             <a:endParaRPr lang="en-US"/>
           </a:p>
@@ -1818,7 +1819,7 @@
           <a:p>
             <a:fld id="{E1D21841-37EE-4C4F-8C0E-B2B5846679B2}" type="datetimeFigureOut">
               <a:rPr lang="en-US" smtClean="0"/>
-              <a:t>8/27/23</a:t>
+              <a:t>9/10/23</a:t>
             </a:fld>
             <a:endParaRPr lang="en-US"/>
           </a:p>
@@ -1959,7 +1960,7 @@
           <a:p>
             <a:fld id="{E1D21841-37EE-4C4F-8C0E-B2B5846679B2}" type="datetimeFigureOut">
               <a:rPr lang="en-US" smtClean="0"/>
-              <a:t>8/27/23</a:t>
+              <a:t>9/10/23</a:t>
             </a:fld>
             <a:endParaRPr lang="en-US"/>
           </a:p>
@@ -2072,7 +2073,7 @@
           <a:p>
             <a:fld id="{E1D21841-37EE-4C4F-8C0E-B2B5846679B2}" type="datetimeFigureOut">
               <a:rPr lang="en-US" smtClean="0"/>
-              <a:t>8/27/23</a:t>
+              <a:t>9/10/23</a:t>
             </a:fld>
             <a:endParaRPr lang="en-US"/>
           </a:p>
@@ -2383,7 +2384,7 @@
           <a:p>
             <a:fld id="{E1D21841-37EE-4C4F-8C0E-B2B5846679B2}" type="datetimeFigureOut">
               <a:rPr lang="en-US" smtClean="0"/>
-              <a:t>8/27/23</a:t>
+              <a:t>9/10/23</a:t>
             </a:fld>
             <a:endParaRPr lang="en-US"/>
           </a:p>
@@ -2671,7 +2672,7 @@
           <a:p>
             <a:fld id="{E1D21841-37EE-4C4F-8C0E-B2B5846679B2}" type="datetimeFigureOut">
               <a:rPr lang="en-US" smtClean="0"/>
-              <a:t>8/27/23</a:t>
+              <a:t>9/10/23</a:t>
             </a:fld>
             <a:endParaRPr lang="en-US"/>
           </a:p>
@@ -2912,7 +2913,7 @@
           <a:p>
             <a:fld id="{E1D21841-37EE-4C4F-8C0E-B2B5846679B2}" type="datetimeFigureOut">
               <a:rPr lang="en-US" smtClean="0"/>
-              <a:t>8/27/23</a:t>
+              <a:t>9/10/23</a:t>
             </a:fld>
             <a:endParaRPr lang="en-US"/>
           </a:p>
@@ -3566,6 +3567,797 @@
 </file>
 
 <file path=ppt/slides/slide2.xml><?xml version="1.0" encoding="utf-8"?>
+<p:sld xmlns:a="http://schemas.openxmlformats.org/drawingml/2006/main" xmlns:r="http://schemas.openxmlformats.org/officeDocument/2006/relationships" xmlns:p="http://schemas.openxmlformats.org/presentationml/2006/main">
+  <p:cSld>
+    <p:spTree>
+      <p:nvGrpSpPr>
+        <p:cNvPr id="1" name=""/>
+        <p:cNvGrpSpPr/>
+        <p:nvPr/>
+      </p:nvGrpSpPr>
+      <p:grpSpPr>
+        <a:xfrm>
+          <a:off x="0" y="0"/>
+          <a:ext cx="0" cy="0"/>
+          <a:chOff x="0" y="0"/>
+          <a:chExt cx="0" cy="0"/>
+        </a:xfrm>
+      </p:grpSpPr>
+      <p:grpSp>
+        <p:nvGrpSpPr>
+          <p:cNvPr id="11" name="Group 10">
+            <a:extLst>
+              <a:ext uri="{FF2B5EF4-FFF2-40B4-BE49-F238E27FC236}">
+                <a16:creationId xmlns:a16="http://schemas.microsoft.com/office/drawing/2014/main" id="{2E4A6261-AFC4-9ABD-1B7E-778DEE57197E}"/>
+              </a:ext>
+            </a:extLst>
+          </p:cNvPr>
+          <p:cNvGrpSpPr/>
+          <p:nvPr/>
+        </p:nvGrpSpPr>
+        <p:grpSpPr>
+          <a:xfrm>
+            <a:off x="507179" y="-3509"/>
+            <a:ext cx="9299804" cy="9441816"/>
+            <a:chOff x="507179" y="-3509"/>
+            <a:chExt cx="9299804" cy="9441816"/>
+          </a:xfrm>
+        </p:grpSpPr>
+        <p:pic>
+          <p:nvPicPr>
+            <p:cNvPr id="2" name="Picture 1">
+              <a:extLst>
+                <a:ext uri="{FF2B5EF4-FFF2-40B4-BE49-F238E27FC236}">
+                  <a16:creationId xmlns:a16="http://schemas.microsoft.com/office/drawing/2014/main" id="{18BA72A0-EB38-4E0D-0F1B-DBA735AAD76B}"/>
+                </a:ext>
+              </a:extLst>
+            </p:cNvPr>
+            <p:cNvPicPr>
+              <a:picLocks noChangeAspect="1"/>
+            </p:cNvPicPr>
+            <p:nvPr/>
+          </p:nvPicPr>
+          <p:blipFill>
+            <a:blip r:embed="rId2"/>
+            <a:stretch>
+              <a:fillRect/>
+            </a:stretch>
+          </p:blipFill>
+          <p:spPr>
+            <a:xfrm>
+              <a:off x="510207" y="0"/>
+              <a:ext cx="1766455" cy="2286000"/>
+            </a:xfrm>
+            <a:prstGeom prst="rect">
+              <a:avLst/>
+            </a:prstGeom>
+            <a:ln>
+              <a:solidFill>
+                <a:schemeClr val="bg1">
+                  <a:lumMod val="85000"/>
+                </a:schemeClr>
+              </a:solidFill>
+            </a:ln>
+          </p:spPr>
+        </p:pic>
+        <p:pic>
+          <p:nvPicPr>
+            <p:cNvPr id="4" name="Picture 3">
+              <a:extLst>
+                <a:ext uri="{FF2B5EF4-FFF2-40B4-BE49-F238E27FC236}">
+                  <a16:creationId xmlns:a16="http://schemas.microsoft.com/office/drawing/2014/main" id="{84DE0EC8-D548-8C08-C508-84433E734FAB}"/>
+                </a:ext>
+              </a:extLst>
+            </p:cNvPr>
+            <p:cNvPicPr>
+              <a:picLocks noChangeAspect="1"/>
+            </p:cNvPicPr>
+            <p:nvPr/>
+          </p:nvPicPr>
+          <p:blipFill>
+            <a:blip r:embed="rId3"/>
+            <a:stretch>
+              <a:fillRect/>
+            </a:stretch>
+          </p:blipFill>
+          <p:spPr>
+            <a:xfrm>
+              <a:off x="4272259" y="3508"/>
+              <a:ext cx="1766455" cy="2286000"/>
+            </a:xfrm>
+            <a:prstGeom prst="rect">
+              <a:avLst/>
+            </a:prstGeom>
+            <a:ln>
+              <a:solidFill>
+                <a:schemeClr val="bg1">
+                  <a:lumMod val="85000"/>
+                </a:schemeClr>
+              </a:solidFill>
+            </a:ln>
+          </p:spPr>
+        </p:pic>
+        <p:pic>
+          <p:nvPicPr>
+            <p:cNvPr id="12" name="Picture 11">
+              <a:extLst>
+                <a:ext uri="{FF2B5EF4-FFF2-40B4-BE49-F238E27FC236}">
+                  <a16:creationId xmlns:a16="http://schemas.microsoft.com/office/drawing/2014/main" id="{2881D29B-68B2-75B7-09C2-E8AD5BBE860A}"/>
+                </a:ext>
+              </a:extLst>
+            </p:cNvPr>
+            <p:cNvPicPr>
+              <a:picLocks noChangeAspect="1"/>
+            </p:cNvPicPr>
+            <p:nvPr/>
+          </p:nvPicPr>
+          <p:blipFill>
+            <a:blip r:embed="rId4"/>
+            <a:stretch>
+              <a:fillRect/>
+            </a:stretch>
+          </p:blipFill>
+          <p:spPr>
+            <a:xfrm>
+              <a:off x="6153285" y="0"/>
+              <a:ext cx="1766455" cy="2286000"/>
+            </a:xfrm>
+            <a:prstGeom prst="rect">
+              <a:avLst/>
+            </a:prstGeom>
+            <a:ln>
+              <a:solidFill>
+                <a:schemeClr val="bg1">
+                  <a:lumMod val="85000"/>
+                </a:schemeClr>
+              </a:solidFill>
+            </a:ln>
+          </p:spPr>
+        </p:pic>
+        <p:pic>
+          <p:nvPicPr>
+            <p:cNvPr id="13" name="Picture 12">
+              <a:extLst>
+                <a:ext uri="{FF2B5EF4-FFF2-40B4-BE49-F238E27FC236}">
+                  <a16:creationId xmlns:a16="http://schemas.microsoft.com/office/drawing/2014/main" id="{F17A2A33-1825-A918-C4CF-514CC769F28D}"/>
+                </a:ext>
+              </a:extLst>
+            </p:cNvPr>
+            <p:cNvPicPr>
+              <a:picLocks noChangeAspect="1"/>
+            </p:cNvPicPr>
+            <p:nvPr/>
+          </p:nvPicPr>
+          <p:blipFill>
+            <a:blip r:embed="rId5"/>
+            <a:stretch>
+              <a:fillRect/>
+            </a:stretch>
+          </p:blipFill>
+          <p:spPr>
+            <a:xfrm>
+              <a:off x="8034311" y="0"/>
+              <a:ext cx="1766455" cy="2286000"/>
+            </a:xfrm>
+            <a:prstGeom prst="rect">
+              <a:avLst/>
+            </a:prstGeom>
+            <a:ln>
+              <a:solidFill>
+                <a:schemeClr val="bg1">
+                  <a:lumMod val="85000"/>
+                </a:schemeClr>
+              </a:solidFill>
+            </a:ln>
+          </p:spPr>
+        </p:pic>
+        <p:pic>
+          <p:nvPicPr>
+            <p:cNvPr id="14" name="Picture 13">
+              <a:extLst>
+                <a:ext uri="{FF2B5EF4-FFF2-40B4-BE49-F238E27FC236}">
+                  <a16:creationId xmlns:a16="http://schemas.microsoft.com/office/drawing/2014/main" id="{13C96219-DA41-8082-6A78-A7AE3F7CF294}"/>
+                </a:ext>
+              </a:extLst>
+            </p:cNvPr>
+            <p:cNvPicPr>
+              <a:picLocks noChangeAspect="1"/>
+            </p:cNvPicPr>
+            <p:nvPr/>
+          </p:nvPicPr>
+          <p:blipFill>
+            <a:blip r:embed="rId6"/>
+            <a:stretch>
+              <a:fillRect/>
+            </a:stretch>
+          </p:blipFill>
+          <p:spPr>
+            <a:xfrm>
+              <a:off x="507179" y="2380585"/>
+              <a:ext cx="1766455" cy="2286000"/>
+            </a:xfrm>
+            <a:prstGeom prst="rect">
+              <a:avLst/>
+            </a:prstGeom>
+            <a:ln>
+              <a:solidFill>
+                <a:schemeClr val="bg1">
+                  <a:lumMod val="85000"/>
+                </a:schemeClr>
+              </a:solidFill>
+            </a:ln>
+          </p:spPr>
+        </p:pic>
+        <p:pic>
+          <p:nvPicPr>
+            <p:cNvPr id="15" name="Picture 14">
+              <a:extLst>
+                <a:ext uri="{FF2B5EF4-FFF2-40B4-BE49-F238E27FC236}">
+                  <a16:creationId xmlns:a16="http://schemas.microsoft.com/office/drawing/2014/main" id="{7A3A457C-1E02-B117-D658-10230C16613A}"/>
+                </a:ext>
+              </a:extLst>
+            </p:cNvPr>
+            <p:cNvPicPr>
+              <a:picLocks noChangeAspect="1"/>
+            </p:cNvPicPr>
+            <p:nvPr/>
+          </p:nvPicPr>
+          <p:blipFill>
+            <a:blip r:embed="rId7"/>
+            <a:stretch>
+              <a:fillRect/>
+            </a:stretch>
+          </p:blipFill>
+          <p:spPr>
+            <a:xfrm>
+              <a:off x="2388205" y="2380585"/>
+              <a:ext cx="1766455" cy="2286000"/>
+            </a:xfrm>
+            <a:prstGeom prst="rect">
+              <a:avLst/>
+            </a:prstGeom>
+            <a:ln>
+              <a:solidFill>
+                <a:schemeClr val="bg1">
+                  <a:lumMod val="85000"/>
+                </a:schemeClr>
+              </a:solidFill>
+            </a:ln>
+          </p:spPr>
+        </p:pic>
+        <p:pic>
+          <p:nvPicPr>
+            <p:cNvPr id="16" name="Picture 15">
+              <a:extLst>
+                <a:ext uri="{FF2B5EF4-FFF2-40B4-BE49-F238E27FC236}">
+                  <a16:creationId xmlns:a16="http://schemas.microsoft.com/office/drawing/2014/main" id="{7B946604-E21F-A54F-5E29-7CC1ADFCBDD9}"/>
+                </a:ext>
+              </a:extLst>
+            </p:cNvPr>
+            <p:cNvPicPr>
+              <a:picLocks noChangeAspect="1"/>
+            </p:cNvPicPr>
+            <p:nvPr/>
+          </p:nvPicPr>
+          <p:blipFill>
+            <a:blip r:embed="rId8"/>
+            <a:stretch>
+              <a:fillRect/>
+            </a:stretch>
+          </p:blipFill>
+          <p:spPr>
+            <a:xfrm>
+              <a:off x="4269231" y="2380585"/>
+              <a:ext cx="1766455" cy="2286000"/>
+            </a:xfrm>
+            <a:prstGeom prst="rect">
+              <a:avLst/>
+            </a:prstGeom>
+            <a:ln>
+              <a:solidFill>
+                <a:schemeClr val="bg1">
+                  <a:lumMod val="85000"/>
+                </a:schemeClr>
+              </a:solidFill>
+            </a:ln>
+          </p:spPr>
+        </p:pic>
+        <p:pic>
+          <p:nvPicPr>
+            <p:cNvPr id="17" name="Picture 16">
+              <a:extLst>
+                <a:ext uri="{FF2B5EF4-FFF2-40B4-BE49-F238E27FC236}">
+                  <a16:creationId xmlns:a16="http://schemas.microsoft.com/office/drawing/2014/main" id="{A0774EDB-4A1B-EAAA-3541-EC756F478B1A}"/>
+                </a:ext>
+              </a:extLst>
+            </p:cNvPr>
+            <p:cNvPicPr>
+              <a:picLocks noChangeAspect="1"/>
+            </p:cNvPicPr>
+            <p:nvPr/>
+          </p:nvPicPr>
+          <p:blipFill>
+            <a:blip r:embed="rId9"/>
+            <a:stretch>
+              <a:fillRect/>
+            </a:stretch>
+          </p:blipFill>
+          <p:spPr>
+            <a:xfrm>
+              <a:off x="6150257" y="2382339"/>
+              <a:ext cx="1766455" cy="2286000"/>
+            </a:xfrm>
+            <a:prstGeom prst="rect">
+              <a:avLst/>
+            </a:prstGeom>
+            <a:ln>
+              <a:solidFill>
+                <a:schemeClr val="bg1">
+                  <a:lumMod val="85000"/>
+                </a:schemeClr>
+              </a:solidFill>
+            </a:ln>
+          </p:spPr>
+        </p:pic>
+        <p:pic>
+          <p:nvPicPr>
+            <p:cNvPr id="18" name="Picture 17">
+              <a:extLst>
+                <a:ext uri="{FF2B5EF4-FFF2-40B4-BE49-F238E27FC236}">
+                  <a16:creationId xmlns:a16="http://schemas.microsoft.com/office/drawing/2014/main" id="{538ECC0C-902B-2498-DFB3-98E28C11710F}"/>
+                </a:ext>
+              </a:extLst>
+            </p:cNvPr>
+            <p:cNvPicPr>
+              <a:picLocks noChangeAspect="1"/>
+            </p:cNvPicPr>
+            <p:nvPr/>
+          </p:nvPicPr>
+          <p:blipFill>
+            <a:blip r:embed="rId10"/>
+            <a:stretch>
+              <a:fillRect/>
+            </a:stretch>
+          </p:blipFill>
+          <p:spPr>
+            <a:xfrm>
+              <a:off x="8031283" y="2380585"/>
+              <a:ext cx="1766455" cy="2286000"/>
+            </a:xfrm>
+            <a:prstGeom prst="rect">
+              <a:avLst/>
+            </a:prstGeom>
+            <a:ln>
+              <a:solidFill>
+                <a:schemeClr val="bg1">
+                  <a:lumMod val="85000"/>
+                </a:schemeClr>
+              </a:solidFill>
+            </a:ln>
+          </p:spPr>
+        </p:pic>
+        <p:pic>
+          <p:nvPicPr>
+            <p:cNvPr id="21" name="Picture 20">
+              <a:extLst>
+                <a:ext uri="{FF2B5EF4-FFF2-40B4-BE49-F238E27FC236}">
+                  <a16:creationId xmlns:a16="http://schemas.microsoft.com/office/drawing/2014/main" id="{556FFD56-3706-EE2F-3228-C70BE7F138C0}"/>
+                </a:ext>
+              </a:extLst>
+            </p:cNvPr>
+            <p:cNvPicPr>
+              <a:picLocks noChangeAspect="1"/>
+            </p:cNvPicPr>
+            <p:nvPr/>
+          </p:nvPicPr>
+          <p:blipFill>
+            <a:blip r:embed="rId11"/>
+            <a:stretch>
+              <a:fillRect/>
+            </a:stretch>
+          </p:blipFill>
+          <p:spPr>
+            <a:xfrm>
+              <a:off x="4269231" y="4764678"/>
+              <a:ext cx="1766455" cy="2286000"/>
+            </a:xfrm>
+            <a:prstGeom prst="rect">
+              <a:avLst/>
+            </a:prstGeom>
+            <a:ln>
+              <a:solidFill>
+                <a:schemeClr val="bg1">
+                  <a:lumMod val="85000"/>
+                </a:schemeClr>
+              </a:solidFill>
+            </a:ln>
+          </p:spPr>
+        </p:pic>
+        <p:pic>
+          <p:nvPicPr>
+            <p:cNvPr id="22" name="Picture 21">
+              <a:extLst>
+                <a:ext uri="{FF2B5EF4-FFF2-40B4-BE49-F238E27FC236}">
+                  <a16:creationId xmlns:a16="http://schemas.microsoft.com/office/drawing/2014/main" id="{14F4F339-DFC0-0A3F-E352-0FB648FF8037}"/>
+                </a:ext>
+              </a:extLst>
+            </p:cNvPr>
+            <p:cNvPicPr>
+              <a:picLocks noChangeAspect="1"/>
+            </p:cNvPicPr>
+            <p:nvPr/>
+          </p:nvPicPr>
+          <p:blipFill>
+            <a:blip r:embed="rId12"/>
+            <a:stretch>
+              <a:fillRect/>
+            </a:stretch>
+          </p:blipFill>
+          <p:spPr>
+            <a:xfrm>
+              <a:off x="6149500" y="4764678"/>
+              <a:ext cx="1766455" cy="2286000"/>
+            </a:xfrm>
+            <a:prstGeom prst="rect">
+              <a:avLst/>
+            </a:prstGeom>
+            <a:ln>
+              <a:solidFill>
+                <a:schemeClr val="bg1">
+                  <a:lumMod val="85000"/>
+                </a:schemeClr>
+              </a:solidFill>
+            </a:ln>
+          </p:spPr>
+        </p:pic>
+        <p:pic>
+          <p:nvPicPr>
+            <p:cNvPr id="24" name="Picture 23">
+              <a:extLst>
+                <a:ext uri="{FF2B5EF4-FFF2-40B4-BE49-F238E27FC236}">
+                  <a16:creationId xmlns:a16="http://schemas.microsoft.com/office/drawing/2014/main" id="{11B8441F-F574-2F6B-B088-10290209B1E3}"/>
+                </a:ext>
+              </a:extLst>
+            </p:cNvPr>
+            <p:cNvPicPr>
+              <a:picLocks noChangeAspect="1"/>
+            </p:cNvPicPr>
+            <p:nvPr/>
+          </p:nvPicPr>
+          <p:blipFill>
+            <a:blip r:embed="rId13"/>
+            <a:stretch>
+              <a:fillRect/>
+            </a:stretch>
+          </p:blipFill>
+          <p:spPr>
+            <a:xfrm>
+              <a:off x="508458" y="7152307"/>
+              <a:ext cx="1766455" cy="2286000"/>
+            </a:xfrm>
+            <a:prstGeom prst="rect">
+              <a:avLst/>
+            </a:prstGeom>
+            <a:ln>
+              <a:solidFill>
+                <a:schemeClr val="bg1">
+                  <a:lumMod val="85000"/>
+                </a:schemeClr>
+              </a:solidFill>
+            </a:ln>
+          </p:spPr>
+        </p:pic>
+        <p:pic>
+          <p:nvPicPr>
+            <p:cNvPr id="25" name="Picture 24">
+              <a:extLst>
+                <a:ext uri="{FF2B5EF4-FFF2-40B4-BE49-F238E27FC236}">
+                  <a16:creationId xmlns:a16="http://schemas.microsoft.com/office/drawing/2014/main" id="{AC8B3C10-9E9F-30C4-FB48-31FDE05FFF0A}"/>
+                </a:ext>
+              </a:extLst>
+            </p:cNvPr>
+            <p:cNvPicPr>
+              <a:picLocks noChangeAspect="1"/>
+            </p:cNvPicPr>
+            <p:nvPr/>
+          </p:nvPicPr>
+          <p:blipFill>
+            <a:blip r:embed="rId14"/>
+            <a:stretch>
+              <a:fillRect/>
+            </a:stretch>
+          </p:blipFill>
+          <p:spPr>
+            <a:xfrm>
+              <a:off x="4274493" y="7152307"/>
+              <a:ext cx="1766455" cy="2286000"/>
+            </a:xfrm>
+            <a:prstGeom prst="rect">
+              <a:avLst/>
+            </a:prstGeom>
+            <a:ln>
+              <a:solidFill>
+                <a:schemeClr val="bg1">
+                  <a:lumMod val="85000"/>
+                </a:schemeClr>
+              </a:solidFill>
+            </a:ln>
+          </p:spPr>
+        </p:pic>
+        <p:pic>
+          <p:nvPicPr>
+            <p:cNvPr id="26" name="Picture 25">
+              <a:extLst>
+                <a:ext uri="{FF2B5EF4-FFF2-40B4-BE49-F238E27FC236}">
+                  <a16:creationId xmlns:a16="http://schemas.microsoft.com/office/drawing/2014/main" id="{A6B90D79-6008-DCA5-433C-165B6C6940D7}"/>
+                </a:ext>
+              </a:extLst>
+            </p:cNvPr>
+            <p:cNvPicPr>
+              <a:picLocks noChangeAspect="1"/>
+            </p:cNvPicPr>
+            <p:nvPr/>
+          </p:nvPicPr>
+          <p:blipFill>
+            <a:blip r:embed="rId15"/>
+            <a:stretch>
+              <a:fillRect/>
+            </a:stretch>
+          </p:blipFill>
+          <p:spPr>
+            <a:xfrm>
+              <a:off x="6149263" y="7145263"/>
+              <a:ext cx="1766455" cy="2286000"/>
+            </a:xfrm>
+            <a:prstGeom prst="rect">
+              <a:avLst/>
+            </a:prstGeom>
+            <a:ln>
+              <a:solidFill>
+                <a:schemeClr val="bg1">
+                  <a:lumMod val="85000"/>
+                </a:schemeClr>
+              </a:solidFill>
+            </a:ln>
+          </p:spPr>
+        </p:pic>
+        <p:pic>
+          <p:nvPicPr>
+            <p:cNvPr id="5" name="Picture 4">
+              <a:extLst>
+                <a:ext uri="{FF2B5EF4-FFF2-40B4-BE49-F238E27FC236}">
+                  <a16:creationId xmlns:a16="http://schemas.microsoft.com/office/drawing/2014/main" id="{0153E1A1-C9FA-6CE7-889A-25A598827B6C}"/>
+                </a:ext>
+              </a:extLst>
+            </p:cNvPr>
+            <p:cNvPicPr>
+              <a:picLocks noChangeAspect="1"/>
+            </p:cNvPicPr>
+            <p:nvPr/>
+          </p:nvPicPr>
+          <p:blipFill>
+            <a:blip r:embed="rId16"/>
+            <a:stretch>
+              <a:fillRect/>
+            </a:stretch>
+          </p:blipFill>
+          <p:spPr>
+            <a:xfrm>
+              <a:off x="2388205" y="-3509"/>
+              <a:ext cx="1766692" cy="2286001"/>
+            </a:xfrm>
+            <a:prstGeom prst="rect">
+              <a:avLst/>
+            </a:prstGeom>
+            <a:ln>
+              <a:solidFill>
+                <a:schemeClr val="bg1">
+                  <a:lumMod val="85000"/>
+                </a:schemeClr>
+              </a:solidFill>
+            </a:ln>
+          </p:spPr>
+        </p:pic>
+        <p:pic>
+          <p:nvPicPr>
+            <p:cNvPr id="8" name="Picture 7">
+              <a:extLst>
+                <a:ext uri="{FF2B5EF4-FFF2-40B4-BE49-F238E27FC236}">
+                  <a16:creationId xmlns:a16="http://schemas.microsoft.com/office/drawing/2014/main" id="{370EEB43-2FAB-DEA0-87B9-2E9FE22C15C5}"/>
+                </a:ext>
+              </a:extLst>
+            </p:cNvPr>
+            <p:cNvPicPr>
+              <a:picLocks noChangeAspect="1"/>
+            </p:cNvPicPr>
+            <p:nvPr/>
+          </p:nvPicPr>
+          <p:blipFill>
+            <a:blip r:embed="rId17"/>
+            <a:stretch>
+              <a:fillRect/>
+            </a:stretch>
+          </p:blipFill>
+          <p:spPr>
+            <a:xfrm>
+              <a:off x="2394803" y="7152308"/>
+              <a:ext cx="1760656" cy="2278956"/>
+            </a:xfrm>
+            <a:prstGeom prst="rect">
+              <a:avLst/>
+            </a:prstGeom>
+            <a:ln>
+              <a:solidFill>
+                <a:schemeClr val="bg1">
+                  <a:lumMod val="85000"/>
+                </a:schemeClr>
+              </a:solidFill>
+            </a:ln>
+          </p:spPr>
+        </p:pic>
+        <p:pic>
+          <p:nvPicPr>
+            <p:cNvPr id="9" name="Picture 8">
+              <a:extLst>
+                <a:ext uri="{FF2B5EF4-FFF2-40B4-BE49-F238E27FC236}">
+                  <a16:creationId xmlns:a16="http://schemas.microsoft.com/office/drawing/2014/main" id="{86DDB529-F733-9169-E755-AE81292B975A}"/>
+                </a:ext>
+              </a:extLst>
+            </p:cNvPr>
+            <p:cNvPicPr>
+              <a:picLocks noChangeAspect="1"/>
+            </p:cNvPicPr>
+            <p:nvPr/>
+          </p:nvPicPr>
+          <p:blipFill>
+            <a:blip r:embed="rId18"/>
+            <a:stretch>
+              <a:fillRect/>
+            </a:stretch>
+          </p:blipFill>
+          <p:spPr>
+            <a:xfrm>
+              <a:off x="8040528" y="7145263"/>
+              <a:ext cx="1766455" cy="2286461"/>
+            </a:xfrm>
+            <a:prstGeom prst="rect">
+              <a:avLst/>
+            </a:prstGeom>
+            <a:ln>
+              <a:solidFill>
+                <a:schemeClr val="bg1">
+                  <a:lumMod val="85000"/>
+                </a:schemeClr>
+              </a:solidFill>
+            </a:ln>
+          </p:spPr>
+        </p:pic>
+        <p:pic>
+          <p:nvPicPr>
+            <p:cNvPr id="3" name="Picture 2">
+              <a:extLst>
+                <a:ext uri="{FF2B5EF4-FFF2-40B4-BE49-F238E27FC236}">
+                  <a16:creationId xmlns:a16="http://schemas.microsoft.com/office/drawing/2014/main" id="{43C3769B-0181-5CE0-A8E9-575A68CD6081}"/>
+                </a:ext>
+              </a:extLst>
+            </p:cNvPr>
+            <p:cNvPicPr>
+              <a:picLocks noChangeAspect="1"/>
+            </p:cNvPicPr>
+            <p:nvPr/>
+          </p:nvPicPr>
+          <p:blipFill>
+            <a:blip r:embed="rId19"/>
+            <a:stretch>
+              <a:fillRect/>
+            </a:stretch>
+          </p:blipFill>
+          <p:spPr>
+            <a:xfrm>
+              <a:off x="8029769" y="4761170"/>
+              <a:ext cx="1766455" cy="2287152"/>
+            </a:xfrm>
+            <a:prstGeom prst="rect">
+              <a:avLst/>
+            </a:prstGeom>
+            <a:ln>
+              <a:solidFill>
+                <a:schemeClr val="bg1">
+                  <a:lumMod val="85000"/>
+                </a:schemeClr>
+              </a:solidFill>
+            </a:ln>
+          </p:spPr>
+        </p:pic>
+        <p:pic>
+          <p:nvPicPr>
+            <p:cNvPr id="7" name="Picture 6">
+              <a:extLst>
+                <a:ext uri="{FF2B5EF4-FFF2-40B4-BE49-F238E27FC236}">
+                  <a16:creationId xmlns:a16="http://schemas.microsoft.com/office/drawing/2014/main" id="{B16CE478-9FDF-9F68-6F48-EBE9AE3D5E2C}"/>
+                </a:ext>
+              </a:extLst>
+            </p:cNvPr>
+            <p:cNvPicPr>
+              <a:picLocks noChangeAspect="1"/>
+            </p:cNvPicPr>
+            <p:nvPr/>
+          </p:nvPicPr>
+          <p:blipFill>
+            <a:blip r:embed="rId20"/>
+            <a:stretch>
+              <a:fillRect/>
+            </a:stretch>
+          </p:blipFill>
+          <p:spPr>
+            <a:xfrm>
+              <a:off x="507179" y="4761170"/>
+              <a:ext cx="1762233" cy="2286000"/>
+            </a:xfrm>
+            <a:prstGeom prst="rect">
+              <a:avLst/>
+            </a:prstGeom>
+            <a:ln>
+              <a:solidFill>
+                <a:schemeClr val="bg1">
+                  <a:lumMod val="85000"/>
+                </a:schemeClr>
+              </a:solidFill>
+            </a:ln>
+          </p:spPr>
+        </p:pic>
+        <p:pic>
+          <p:nvPicPr>
+            <p:cNvPr id="10" name="Picture 9">
+              <a:extLst>
+                <a:ext uri="{FF2B5EF4-FFF2-40B4-BE49-F238E27FC236}">
+                  <a16:creationId xmlns:a16="http://schemas.microsoft.com/office/drawing/2014/main" id="{48E5622F-F877-FCD0-A797-EF986AE4DC95}"/>
+                </a:ext>
+              </a:extLst>
+            </p:cNvPr>
+            <p:cNvPicPr>
+              <a:picLocks noChangeAspect="1"/>
+            </p:cNvPicPr>
+            <p:nvPr/>
+          </p:nvPicPr>
+          <p:blipFill>
+            <a:blip r:embed="rId21"/>
+            <a:stretch>
+              <a:fillRect/>
+            </a:stretch>
+          </p:blipFill>
+          <p:spPr>
+            <a:xfrm>
+              <a:off x="2383226" y="4761170"/>
+              <a:ext cx="1765401" cy="2286000"/>
+            </a:xfrm>
+            <a:prstGeom prst="rect">
+              <a:avLst/>
+            </a:prstGeom>
+            <a:ln>
+              <a:solidFill>
+                <a:schemeClr val="bg1">
+                  <a:lumMod val="85000"/>
+                </a:schemeClr>
+              </a:solidFill>
+            </a:ln>
+          </p:spPr>
+        </p:pic>
+      </p:grpSp>
+    </p:spTree>
+    <p:extLst>
+      <p:ext uri="{BB962C8B-B14F-4D97-AF65-F5344CB8AC3E}">
+        <p14:creationId xmlns:p14="http://schemas.microsoft.com/office/powerpoint/2010/main" val="2348708971"/>
+      </p:ext>
+    </p:extLst>
+  </p:cSld>
+  <p:clrMapOvr>
+    <a:masterClrMapping/>
+  </p:clrMapOvr>
+</p:sld>
+</file>
+
+<file path=ppt/slides/slide3.xml><?xml version="1.0" encoding="utf-8"?>
 <p:sld xmlns:a="http://schemas.openxmlformats.org/drawingml/2006/main" xmlns:r="http://schemas.openxmlformats.org/officeDocument/2006/relationships" xmlns:p="http://schemas.openxmlformats.org/presentationml/2006/main">
   <p:cSld>
     <p:spTree>
@@ -4346,7 +5138,7 @@
     </p:spTree>
     <p:extLst>
       <p:ext uri="{BB962C8B-B14F-4D97-AF65-F5344CB8AC3E}">
-        <p14:creationId xmlns:p14="http://schemas.microsoft.com/office/powerpoint/2010/main" val="2348708971"/>
+        <p14:creationId xmlns:p14="http://schemas.microsoft.com/office/powerpoint/2010/main" val="533532317"/>
       </p:ext>
     </p:extLst>
   </p:cSld>
@@ -4356,7 +5148,7 @@
 </p:sld>
 </file>
 
-<file path=ppt/slides/slide3.xml><?xml version="1.0" encoding="utf-8"?>
+<file path=ppt/slides/slide4.xml><?xml version="1.0" encoding="utf-8"?>
 <p:sld xmlns:a="http://schemas.openxmlformats.org/drawingml/2006/main" xmlns:r="http://schemas.openxmlformats.org/officeDocument/2006/relationships" xmlns:p="http://schemas.openxmlformats.org/presentationml/2006/main">
   <p:cSld>
     <p:spTree>
@@ -4572,7 +5364,7 @@
 </p:sld>
 </file>
 
-<file path=ppt/slides/slide4.xml><?xml version="1.0" encoding="utf-8"?>
+<file path=ppt/slides/slide5.xml><?xml version="1.0" encoding="utf-8"?>
 <p:sld xmlns:a="http://schemas.openxmlformats.org/drawingml/2006/main" xmlns:r="http://schemas.openxmlformats.org/officeDocument/2006/relationships" xmlns:p="http://schemas.openxmlformats.org/presentationml/2006/main">
   <p:cSld>
     <p:spTree>

</xml_diff>